<commit_message>
000 - update with link to code repo - BP
</commit_message>
<xml_diff>
--- a/sgf_dnug_presentation.pptx
+++ b/sgf_dnug_presentation.pptx
@@ -5,10 +5,10 @@
     <p:sldMasterId id="2147483648" r:id="rId1"/>
   </p:sldMasterIdLst>
   <p:notesMasterIdLst>
-    <p:notesMasterId r:id="rId14"/>
+    <p:notesMasterId r:id="rId15"/>
   </p:notesMasterIdLst>
   <p:handoutMasterIdLst>
-    <p:handoutMasterId r:id="rId15"/>
+    <p:handoutMasterId r:id="rId16"/>
   </p:handoutMasterIdLst>
   <p:sldIdLst>
     <p:sldId id="256" r:id="rId2"/>
@@ -23,6 +23,7 @@
     <p:sldId id="403" r:id="rId11"/>
     <p:sldId id="405" r:id="rId12"/>
     <p:sldId id="406" r:id="rId13"/>
+    <p:sldId id="416" r:id="rId14"/>
   </p:sldIdLst>
   <p:sldSz cx="24384000" cy="13716000"/>
   <p:notesSz cx="6858000" cy="9144000"/>
@@ -326,10 +327,10 @@
   </p:defaultTextStyle>
   <p:extLst>
     <p:ext uri="{EFAFB233-063F-42B5-8137-9DF3F51BA10A}">
-      <p15:sldGuideLst xmlns:p15="http://schemas.microsoft.com/office/powerpoint/2012/main" xmlns=""/>
+      <p15:sldGuideLst xmlns="" xmlns:p15="http://schemas.microsoft.com/office/powerpoint/2012/main"/>
     </p:ext>
     <p:ext uri="{2D200454-40CA-4A62-9FC3-DE9A4176ACB9}">
-      <p15:notesGuideLst xmlns:p15="http://schemas.microsoft.com/office/powerpoint/2012/main" xmlns=""/>
+      <p15:notesGuideLst xmlns="" xmlns:p15="http://schemas.microsoft.com/office/powerpoint/2012/main"/>
     </p:ext>
   </p:extLst>
 </p:presentation>
@@ -5332,7 +5333,7 @@
           </a:ln>
           <a:extLst>
             <a:ext uri="{C572A759-6A51-4108-AA02-DFA0A04FC94B}">
-              <ma14:wrappingTextBoxFlag xmlns:ma14="http://schemas.microsoft.com/office/mac/drawingml/2011/main" xmlns="" val="1"/>
+              <ma14:wrappingTextBoxFlag xmlns="" xmlns:ma14="http://schemas.microsoft.com/office/mac/drawingml/2011/main" val="1"/>
             </a:ext>
           </a:extLst>
         </p:spPr>
@@ -5386,7 +5387,7 @@
           </a:ln>
           <a:extLst>
             <a:ext uri="{C572A759-6A51-4108-AA02-DFA0A04FC94B}">
-              <ma14:wrappingTextBoxFlag xmlns:ma14="http://schemas.microsoft.com/office/mac/drawingml/2011/main" xmlns="" val="1"/>
+              <ma14:wrappingTextBoxFlag xmlns="" xmlns:ma14="http://schemas.microsoft.com/office/mac/drawingml/2011/main" val="1"/>
             </a:ext>
           </a:extLst>
         </p:spPr>
@@ -6178,6 +6179,94 @@
 </p:sld>
 </file>
 
+<file path=ppt/slides/slide13.xml><?xml version="1.0" encoding="utf-8"?>
+<p:sld xmlns:a="http://schemas.openxmlformats.org/drawingml/2006/main" xmlns:r="http://schemas.openxmlformats.org/officeDocument/2006/relationships" xmlns:p="http://schemas.openxmlformats.org/presentationml/2006/main">
+  <p:cSld>
+    <p:spTree>
+      <p:nvGrpSpPr>
+        <p:cNvPr id="1" name=""/>
+        <p:cNvGrpSpPr/>
+        <p:nvPr/>
+      </p:nvGrpSpPr>
+      <p:grpSpPr>
+        <a:xfrm>
+          <a:off x="0" y="0"/>
+          <a:ext cx="0" cy="0"/>
+          <a:chOff x="0" y="0"/>
+          <a:chExt cx="0" cy="0"/>
+        </a:xfrm>
+      </p:grpSpPr>
+      <p:sp>
+        <p:nvSpPr>
+          <p:cNvPr id="5" name="Text Placeholder 4"/>
+          <p:cNvSpPr>
+            <a:spLocks noGrp="1"/>
+          </p:cNvSpPr>
+          <p:nvPr>
+            <p:ph type="body" sz="quarter" idx="18"/>
+          </p:nvPr>
+        </p:nvSpPr>
+        <p:spPr>
+          <a:xfrm>
+            <a:off x="1799871" y="3067057"/>
+            <a:ext cx="20590572" cy="7876775"/>
+          </a:xfrm>
+        </p:spPr>
+        <p:txBody>
+          <a:bodyPr/>
+          <a:lstStyle/>
+          <a:p>
+            <a:pPr marL="0" indent="0">
+              <a:buNone/>
+            </a:pPr>
+            <a:r>
+              <a:rPr lang="en-US" sz="6000" dirty="0"/>
+              <a:t>Code available: </a:t>
+            </a:r>
+            <a:r>
+              <a:rPr lang="en-US" dirty="0" smtClean="0"/>
+              <a:t>		https://github.com/bpomerenke/sgf_dnug_angular_demo</a:t>
+            </a:r>
+          </a:p>
+          <a:p>
+            <a:endParaRPr lang="en-US" dirty="0" smtClean="0"/>
+          </a:p>
+          <a:p>
+            <a:endParaRPr lang="en-US" dirty="0"/>
+          </a:p>
+          <a:p>
+            <a:pPr marL="0" indent="0" algn="ctr">
+              <a:buNone/>
+            </a:pPr>
+            <a:r>
+              <a:rPr lang="en-US" sz="8000" dirty="0" smtClean="0"/>
+              <a:t>Questions?</a:t>
+            </a:r>
+            <a:endParaRPr lang="en-US" dirty="0"/>
+          </a:p>
+        </p:txBody>
+      </p:sp>
+    </p:spTree>
+    <p:extLst>
+      <p:ext uri="{BB962C8B-B14F-4D97-AF65-F5344CB8AC3E}">
+        <p14:creationId xmlns:p14="http://schemas.microsoft.com/office/powerpoint/2010/main" val="1207130531"/>
+      </p:ext>
+    </p:extLst>
+  </p:cSld>
+  <p:clrMapOvr>
+    <a:masterClrMapping/>
+  </p:clrMapOvr>
+  <p:transition spd="med"/>
+  <p:timing>
+    <p:tnLst>
+      <p:par>
+        <p:cTn id="1" dur="indefinite" restart="never" nodeType="tmRoot"/>
+      </p:par>
+    </p:tnLst>
+  </p:timing>
+</p:sld>
+</file>
+
 <file path=ppt/slides/slide2.xml><?xml version="1.0" encoding="utf-8"?>
 <p:sld xmlns:a="http://schemas.openxmlformats.org/drawingml/2006/main" xmlns:r="http://schemas.openxmlformats.org/officeDocument/2006/relationships" xmlns:p="http://schemas.openxmlformats.org/presentationml/2006/main">
   <p:cSld>
@@ -6261,7 +6350,7 @@
           </a:ln>
           <a:extLst>
             <a:ext uri="{C572A759-6A51-4108-AA02-DFA0A04FC94B}">
-              <ma14:wrappingTextBoxFlag xmlns:ma14="http://schemas.microsoft.com/office/mac/drawingml/2011/main" xmlns="" val="1"/>
+              <ma14:wrappingTextBoxFlag xmlns="" xmlns:ma14="http://schemas.microsoft.com/office/mac/drawingml/2011/main" val="1"/>
             </a:ext>
           </a:extLst>
         </p:spPr>
@@ -6361,7 +6450,7 @@
           </a:ln>
           <a:extLst>
             <a:ext uri="{C572A759-6A51-4108-AA02-DFA0A04FC94B}">
-              <ma14:wrappingTextBoxFlag xmlns:ma14="http://schemas.microsoft.com/office/mac/drawingml/2011/main" xmlns="" val="1"/>
+              <ma14:wrappingTextBoxFlag xmlns="" xmlns:ma14="http://schemas.microsoft.com/office/mac/drawingml/2011/main" val="1"/>
             </a:ext>
           </a:extLst>
         </p:spPr>
@@ -6453,7 +6542,7 @@
           </a:ln>
           <a:extLst>
             <a:ext uri="{C572A759-6A51-4108-AA02-DFA0A04FC94B}">
-              <ma14:wrappingTextBoxFlag xmlns:ma14="http://schemas.microsoft.com/office/mac/drawingml/2011/main" xmlns="" val="1"/>
+              <ma14:wrappingTextBoxFlag xmlns="" xmlns:ma14="http://schemas.microsoft.com/office/mac/drawingml/2011/main" val="1"/>
             </a:ext>
           </a:extLst>
         </p:spPr>
@@ -7450,7 +7539,7 @@
           </a:ln>
           <a:extLst>
             <a:ext uri="{C572A759-6A51-4108-AA02-DFA0A04FC94B}">
-              <ma14:wrappingTextBoxFlag xmlns:ma14="http://schemas.microsoft.com/office/mac/drawingml/2011/main" xmlns="" val="1"/>
+              <ma14:wrappingTextBoxFlag xmlns="" xmlns:ma14="http://schemas.microsoft.com/office/mac/drawingml/2011/main" val="1"/>
             </a:ext>
           </a:extLst>
         </p:spPr>
@@ -7504,7 +7593,7 @@
           </a:ln>
           <a:extLst>
             <a:ext uri="{C572A759-6A51-4108-AA02-DFA0A04FC94B}">
-              <ma14:wrappingTextBoxFlag xmlns:ma14="http://schemas.microsoft.com/office/mac/drawingml/2011/main" xmlns="" val="1"/>
+              <ma14:wrappingTextBoxFlag xmlns="" xmlns:ma14="http://schemas.microsoft.com/office/mac/drawingml/2011/main" val="1"/>
             </a:ext>
           </a:extLst>
         </p:spPr>
@@ -7707,7 +7796,7 @@
           </a:ln>
           <a:extLst>
             <a:ext uri="{C572A759-6A51-4108-AA02-DFA0A04FC94B}">
-              <ma14:wrappingTextBoxFlag xmlns:ma14="http://schemas.microsoft.com/office/mac/drawingml/2011/main" xmlns="" val="1"/>
+              <ma14:wrappingTextBoxFlag xmlns="" xmlns:ma14="http://schemas.microsoft.com/office/mac/drawingml/2011/main" val="1"/>
             </a:ext>
           </a:extLst>
         </p:spPr>
@@ -7790,7 +7879,7 @@
           </a:ln>
           <a:extLst>
             <a:ext uri="{C572A759-6A51-4108-AA02-DFA0A04FC94B}">
-              <ma14:wrappingTextBoxFlag xmlns:ma14="http://schemas.microsoft.com/office/mac/drawingml/2011/main" xmlns="" val="1"/>
+              <ma14:wrappingTextBoxFlag xmlns="" xmlns:ma14="http://schemas.microsoft.com/office/mac/drawingml/2011/main" val="1"/>
             </a:ext>
           </a:extLst>
         </p:spPr>
@@ -7976,7 +8065,7 @@
           </a:ln>
           <a:extLst>
             <a:ext uri="{C572A759-6A51-4108-AA02-DFA0A04FC94B}">
-              <ma14:wrappingTextBoxFlag xmlns:ma14="http://schemas.microsoft.com/office/mac/drawingml/2011/main" xmlns="" val="1"/>
+              <ma14:wrappingTextBoxFlag xmlns="" xmlns:ma14="http://schemas.microsoft.com/office/mac/drawingml/2011/main" val="1"/>
             </a:ext>
           </a:extLst>
         </p:spPr>
@@ -8035,7 +8124,7 @@
           </a:ln>
           <a:extLst>
             <a:ext uri="{C572A759-6A51-4108-AA02-DFA0A04FC94B}">
-              <ma14:wrappingTextBoxFlag xmlns:ma14="http://schemas.microsoft.com/office/mac/drawingml/2011/main" xmlns="" val="1"/>
+              <ma14:wrappingTextBoxFlag xmlns="" xmlns:ma14="http://schemas.microsoft.com/office/mac/drawingml/2011/main" val="1"/>
             </a:ext>
           </a:extLst>
         </p:spPr>
@@ -8209,7 +8298,6 @@
               <a:rPr lang="en-US" dirty="0" smtClean="0"/>
               <a:t>Full application framework (encompasses all aspects needed for a robust web application)</a:t>
             </a:r>
-            <a:endParaRPr lang="en-US" dirty="0" smtClean="0"/>
           </a:p>
           <a:p>
             <a:endParaRPr lang="en-US" dirty="0" smtClean="0"/>
@@ -10895,7 +10983,7 @@
   <a:extraClrSchemeLst/>
   <a:extLst>
     <a:ext uri="{05A4C25C-085E-4340-85A3-A5531E510DB2}">
-      <thm15:themeFamily xmlns:thm15="http://schemas.microsoft.com/office/thememl/2012/main" xmlns="" name="Office Theme" id="{62F939B6-93AF-4DB8-9C6B-D6C7DFDC589F}" vid="{4A3C46E8-61CC-4603-A589-7422A47A8E4A}"/>
+      <thm15:themeFamily xmlns="" xmlns:thm15="http://schemas.microsoft.com/office/thememl/2012/main" name="Office Theme" id="{62F939B6-93AF-4DB8-9C6B-D6C7DFDC589F}" vid="{4A3C46E8-61CC-4603-A589-7422A47A8E4A}"/>
     </a:ext>
   </a:extLst>
 </a:theme>

</xml_diff>